<commit_message>
POST should have been GET
</commit_message>
<xml_diff>
--- a/docgen/sequence-diagram.pptx
+++ b/docgen/sequence-diagram.pptx
@@ -197,7 +197,7 @@
           <a:p>
             <a:fld id="{9D12DC2B-A868-EB48-BC74-89BE29D1DE6E}" type="datetimeFigureOut">
               <a:rPr lang="en-US" smtClean="0"/>
-              <a:t>9/5/24</a:t>
+              <a:t>9/9/24</a:t>
             </a:fld>
             <a:endParaRPr lang="en-US" dirty="0"/>
           </a:p>
@@ -1356,9 +1356,9 @@
           <a:prstGeom prst="straightConnector1">
             <a:avLst/>
           </a:prstGeom>
-          <a:ln w="25400">
+          <a:ln w="26670">
             <a:solidFill>
-              <a:schemeClr val="accent2">
+              <a:schemeClr val="accent6">
                 <a:lumMod val="60000"/>
                 <a:lumOff val="40000"/>
               </a:schemeClr>
@@ -2144,7 +2144,7 @@
           <a:prstGeom prst="straightConnector1">
             <a:avLst/>
           </a:prstGeom>
-          <a:ln w="25400">
+          <a:ln w="26670">
             <a:solidFill>
               <a:schemeClr val="bg1">
                 <a:lumMod val="65000"/>

</xml_diff>

<commit_message>
logotype update + IPR notice
</commit_message>
<xml_diff>
--- a/docgen/sequence-diagram.pptx
+++ b/docgen/sequence-diagram.pptx
@@ -197,7 +197,7 @@
           <a:p>
             <a:fld id="{9D12DC2B-A868-EB48-BC74-89BE29D1DE6E}" type="datetimeFigureOut">
               <a:rPr lang="en-US" smtClean="0"/>
-              <a:t>9/28/24</a:t>
+              <a:t>12/22/24</a:t>
             </a:fld>
             <a:endParaRPr lang="en-US" dirty="0"/>
           </a:p>
@@ -6519,43 +6519,6 @@
           </a:p>
         </p:txBody>
       </p:sp>
-      <p:pic>
-        <p:nvPicPr>
-          <p:cNvPr id="5" name="Picture 4">
-            <a:hlinkClick r:id="rId7" tooltip="Saturn"/>
-            <a:extLst>
-              <a:ext uri="{FF2B5EF4-FFF2-40B4-BE49-F238E27FC236}">
-                <a16:creationId xmlns:a16="http://schemas.microsoft.com/office/drawing/2014/main" id="{8C5F1117-38C7-05E2-E927-15B8C2745600}"/>
-              </a:ext>
-            </a:extLst>
-          </p:cNvPr>
-          <p:cNvPicPr>
-            <a:picLocks noChangeAspect="1"/>
-          </p:cNvPicPr>
-          <p:nvPr/>
-        </p:nvPicPr>
-        <p:blipFill>
-          <a:blip r:embed="rId8" cstate="print">
-            <a:extLst>
-              <a:ext uri="{28A0092B-C50C-407E-A947-70E740481C1C}">
-                <a14:useLocalDpi xmlns:a14="http://schemas.microsoft.com/office/drawing/2010/main" val="0"/>
-              </a:ext>
-            </a:extLst>
-          </a:blip>
-          <a:stretch>
-            <a:fillRect/>
-          </a:stretch>
-        </p:blipFill>
-        <p:spPr>
-          <a:xfrm>
-            <a:off x="1239890" y="2867087"/>
-            <a:ext cx="864096" cy="297309"/>
-          </a:xfrm>
-          <a:prstGeom prst="rect">
-            <a:avLst/>
-          </a:prstGeom>
-        </p:spPr>
-      </p:pic>
       <p:sp>
         <p:nvSpPr>
           <p:cNvPr id="19" name="TextBox 18">
@@ -6610,6 +6573,42 @@
           </a:p>
         </p:txBody>
       </p:sp>
+      <p:pic>
+        <p:nvPicPr>
+          <p:cNvPr id="16" name="Graphic 15">
+            <a:extLst>
+              <a:ext uri="{FF2B5EF4-FFF2-40B4-BE49-F238E27FC236}">
+                <a16:creationId xmlns:a16="http://schemas.microsoft.com/office/drawing/2014/main" id="{1AE965EE-F296-9545-1AB6-1411A9D6C2CA}"/>
+              </a:ext>
+            </a:extLst>
+          </p:cNvPr>
+          <p:cNvPicPr>
+            <a:picLocks noChangeAspect="1"/>
+          </p:cNvPicPr>
+          <p:nvPr/>
+        </p:nvPicPr>
+        <p:blipFill>
+          <a:blip r:embed="rId7">
+            <a:extLst>
+              <a:ext uri="{96DAC541-7B7A-43D3-8B79-37D633B846F1}">
+                <asvg:svgBlip xmlns:asvg="http://schemas.microsoft.com/office/drawing/2016/SVG/main" r:embed="rId8"/>
+              </a:ext>
+            </a:extLst>
+          </a:blip>
+          <a:stretch>
+            <a:fillRect/>
+          </a:stretch>
+        </p:blipFill>
+        <p:spPr>
+          <a:xfrm>
+            <a:off x="1120135" y="2924374"/>
+            <a:ext cx="879136" cy="317188"/>
+          </a:xfrm>
+          <a:prstGeom prst="rect">
+            <a:avLst/>
+          </a:prstGeom>
+        </p:spPr>
+      </p:pic>
     </p:spTree>
     <p:extLst>
       <p:ext uri="{BB962C8B-B14F-4D97-AF65-F5344CB8AC3E}">

</xml_diff>